<commit_message>
take home exam eda
</commit_message>
<xml_diff>
--- a/University_Files/3rd_Year_1st_Sem/MATH13/class_notes/Module-3-Graphs.pptx
+++ b/University_Files/3rd_Year_1st_Sem/MATH13/class_notes/Module-3-Graphs.pptx
@@ -229,7 +229,7 @@
           <a:p>
             <a:fld id="{E1BAA0B9-D8FD-4844-A8CA-48FEBBEDA2DB}" type="datetimeFigureOut">
               <a:rPr lang="en-PH" smtClean="0"/>
-              <a:t>11/10/2025</a:t>
+              <a:t>10/25/2025</a:t>
             </a:fld>
             <a:endParaRPr lang="en-PH"/>
           </a:p>
@@ -646,7 +646,7 @@
           <a:p>
             <a:fld id="{E3D10BC2-6789-4851-A033-6BB5B74F9719}" type="datetime1">
               <a:rPr lang="en-PH" smtClean="0"/>
-              <a:t>11/10/2025</a:t>
+              <a:t>10/25/2025</a:t>
             </a:fld>
             <a:endParaRPr lang="en-PH"/>
           </a:p>
@@ -850,7 +850,7 @@
           <a:p>
             <a:fld id="{D8823F93-9E1B-47F8-9A73-84C33FF9E255}" type="datetime1">
               <a:rPr lang="en-PH" smtClean="0"/>
-              <a:t>11/10/2025</a:t>
+              <a:t>10/25/2025</a:t>
             </a:fld>
             <a:endParaRPr lang="en-PH"/>
           </a:p>
@@ -1064,7 +1064,7 @@
           <a:p>
             <a:fld id="{604A823D-C506-4AFE-9D45-60FB63A359A2}" type="datetime1">
               <a:rPr lang="en-PH" smtClean="0"/>
-              <a:t>11/10/2025</a:t>
+              <a:t>10/25/2025</a:t>
             </a:fld>
             <a:endParaRPr lang="en-PH"/>
           </a:p>
@@ -1268,7 +1268,7 @@
           <a:p>
             <a:fld id="{EB7773F0-1164-4DC7-AD33-7BA84420B4EA}" type="datetime1">
               <a:rPr lang="en-PH" smtClean="0"/>
-              <a:t>11/10/2025</a:t>
+              <a:t>10/25/2025</a:t>
             </a:fld>
             <a:endParaRPr lang="en-PH"/>
           </a:p>
@@ -1548,7 +1548,7 @@
           <a:p>
             <a:fld id="{ADD73A93-19E9-4828-8064-CC092CAEC7ED}" type="datetime1">
               <a:rPr lang="en-PH" smtClean="0"/>
-              <a:t>11/10/2025</a:t>
+              <a:t>10/25/2025</a:t>
             </a:fld>
             <a:endParaRPr lang="en-PH"/>
           </a:p>
@@ -1820,7 +1820,7 @@
           <a:p>
             <a:fld id="{0512CDF2-BBAF-4A67-849A-176266B54FC3}" type="datetime1">
               <a:rPr lang="en-PH" smtClean="0"/>
-              <a:t>11/10/2025</a:t>
+              <a:t>10/25/2025</a:t>
             </a:fld>
             <a:endParaRPr lang="en-PH"/>
           </a:p>
@@ -2239,7 +2239,7 @@
           <a:p>
             <a:fld id="{6FFE2107-952A-4CD4-8A06-E8D3A41B25E3}" type="datetime1">
               <a:rPr lang="en-PH" smtClean="0"/>
-              <a:t>11/10/2025</a:t>
+              <a:t>10/25/2025</a:t>
             </a:fld>
             <a:endParaRPr lang="en-PH"/>
           </a:p>
@@ -2385,7 +2385,7 @@
           <a:p>
             <a:fld id="{37018D2D-EF1B-4D77-8C7A-A68A2DFDDD44}" type="datetime1">
               <a:rPr lang="en-PH" smtClean="0"/>
-              <a:t>11/10/2025</a:t>
+              <a:t>10/25/2025</a:t>
             </a:fld>
             <a:endParaRPr lang="en-PH"/>
           </a:p>
@@ -2502,7 +2502,7 @@
           <a:p>
             <a:fld id="{776A23DB-C0DF-458D-A477-76C508462D47}" type="datetime1">
               <a:rPr lang="en-PH" smtClean="0"/>
-              <a:t>11/10/2025</a:t>
+              <a:t>10/25/2025</a:t>
             </a:fld>
             <a:endParaRPr lang="en-PH"/>
           </a:p>
@@ -2819,7 +2819,7 @@
           <a:p>
             <a:fld id="{079CAA80-2D4E-4300-A8B6-E495431DB547}" type="datetime1">
               <a:rPr lang="en-PH" smtClean="0"/>
-              <a:t>11/10/2025</a:t>
+              <a:t>10/25/2025</a:t>
             </a:fld>
             <a:endParaRPr lang="en-PH"/>
           </a:p>
@@ -3112,7 +3112,7 @@
           <a:p>
             <a:fld id="{10607E7E-B679-43A5-89EA-3CF7EDDD43B9}" type="datetime1">
               <a:rPr lang="en-PH" smtClean="0"/>
-              <a:t>11/10/2025</a:t>
+              <a:t>10/25/2025</a:t>
             </a:fld>
             <a:endParaRPr lang="en-PH"/>
           </a:p>
@@ -3365,7 +3365,7 @@
           <a:p>
             <a:fld id="{169CD29C-53B6-4B88-8A30-339B5EF7DCC5}" type="datetime1">
               <a:rPr lang="en-PH" smtClean="0"/>
-              <a:t>11/10/2025</a:t>
+              <a:t>10/25/2025</a:t>
             </a:fld>
             <a:endParaRPr lang="en-PH"/>
           </a:p>
@@ -3814,7 +3814,7 @@
         </p:blipFill>
         <p:spPr bwMode="auto">
           <a:xfrm>
-            <a:off x="-28203" y="2920"/>
+            <a:off x="-17446" y="53790"/>
             <a:ext cx="12220203" cy="6855080"/>
           </a:xfrm>
           <a:prstGeom prst="rect">
@@ -4366,7 +4366,7 @@
           <a:p>
             <a:fld id="{EB7773F0-1164-4DC7-AD33-7BA84420B4EA}" type="datetime1">
               <a:rPr lang="en-PH" smtClean="0"/>
-              <a:t>11/10/2025</a:t>
+              <a:t>10/25/2025</a:t>
             </a:fld>
             <a:endParaRPr lang="en-PH"/>
           </a:p>
@@ -4822,7 +4822,7 @@
           <a:p>
             <a:fld id="{EB7773F0-1164-4DC7-AD33-7BA84420B4EA}" type="datetime1">
               <a:rPr lang="en-PH" smtClean="0"/>
-              <a:t>11/10/2025</a:t>
+              <a:t>10/25/2025</a:t>
             </a:fld>
             <a:endParaRPr lang="en-PH"/>
           </a:p>
@@ -5280,7 +5280,7 @@
           <a:p>
             <a:fld id="{EB7773F0-1164-4DC7-AD33-7BA84420B4EA}" type="datetime1">
               <a:rPr lang="en-PH" smtClean="0"/>
-              <a:t>11/10/2025</a:t>
+              <a:t>10/25/2025</a:t>
             </a:fld>
             <a:endParaRPr lang="en-PH"/>
           </a:p>
@@ -5734,7 +5734,7 @@
           <a:p>
             <a:fld id="{EB7773F0-1164-4DC7-AD33-7BA84420B4EA}" type="datetime1">
               <a:rPr lang="en-PH" smtClean="0"/>
-              <a:t>11/10/2025</a:t>
+              <a:t>10/25/2025</a:t>
             </a:fld>
             <a:endParaRPr lang="en-PH"/>
           </a:p>
@@ -6192,7 +6192,7 @@
           <a:p>
             <a:fld id="{EB7773F0-1164-4DC7-AD33-7BA84420B4EA}" type="datetime1">
               <a:rPr lang="en-PH" smtClean="0"/>
-              <a:t>11/10/2025</a:t>
+              <a:t>10/25/2025</a:t>
             </a:fld>
             <a:endParaRPr lang="en-PH"/>
           </a:p>
@@ -6660,7 +6660,7 @@
           <a:p>
             <a:fld id="{EB7773F0-1164-4DC7-AD33-7BA84420B4EA}" type="datetime1">
               <a:rPr lang="en-PH" smtClean="0"/>
-              <a:t>11/10/2025</a:t>
+              <a:t>10/25/2025</a:t>
             </a:fld>
             <a:endParaRPr lang="en-PH"/>
           </a:p>
@@ -7128,7 +7128,7 @@
           <a:p>
             <a:fld id="{EB7773F0-1164-4DC7-AD33-7BA84420B4EA}" type="datetime1">
               <a:rPr lang="en-PH" smtClean="0"/>
-              <a:t>11/10/2025</a:t>
+              <a:t>10/25/2025</a:t>
             </a:fld>
             <a:endParaRPr lang="en-PH"/>
           </a:p>
@@ -7581,7 +7581,7 @@
           <a:p>
             <a:fld id="{EB7773F0-1164-4DC7-AD33-7BA84420B4EA}" type="datetime1">
               <a:rPr lang="en-PH" smtClean="0"/>
-              <a:t>11/10/2025</a:t>
+              <a:t>10/25/2025</a:t>
             </a:fld>
             <a:endParaRPr lang="en-PH"/>
           </a:p>
@@ -8036,7 +8036,7 @@
           <a:p>
             <a:fld id="{EB7773F0-1164-4DC7-AD33-7BA84420B4EA}" type="datetime1">
               <a:rPr lang="en-PH" smtClean="0"/>
-              <a:t>11/10/2025</a:t>
+              <a:t>10/25/2025</a:t>
             </a:fld>
             <a:endParaRPr lang="en-PH"/>
           </a:p>
@@ -8686,7 +8686,7 @@
           <a:p>
             <a:fld id="{EB7773F0-1164-4DC7-AD33-7BA84420B4EA}" type="datetime1">
               <a:rPr lang="en-PH" smtClean="0"/>
-              <a:t>11/10/2025</a:t>
+              <a:t>10/25/2025</a:t>
             </a:fld>
             <a:endParaRPr lang="en-PH"/>
           </a:p>
@@ -9160,7 +9160,7 @@
           <a:p>
             <a:fld id="{EB7773F0-1164-4DC7-AD33-7BA84420B4EA}" type="datetime1">
               <a:rPr lang="en-PH" smtClean="0"/>
-              <a:t>11/10/2025</a:t>
+              <a:t>10/25/2025</a:t>
             </a:fld>
             <a:endParaRPr lang="en-PH"/>
           </a:p>
@@ -9616,7 +9616,7 @@
           <a:p>
             <a:fld id="{EB7773F0-1164-4DC7-AD33-7BA84420B4EA}" type="datetime1">
               <a:rPr lang="en-PH" smtClean="0"/>
-              <a:t>11/10/2025</a:t>
+              <a:t>10/25/2025</a:t>
             </a:fld>
             <a:endParaRPr lang="en-PH"/>
           </a:p>
@@ -10247,7 +10247,7 @@
           <a:p>
             <a:fld id="{EB7773F0-1164-4DC7-AD33-7BA84420B4EA}" type="datetime1">
               <a:rPr lang="en-PH" smtClean="0"/>
-              <a:t>11/10/2025</a:t>
+              <a:t>10/25/2025</a:t>
             </a:fld>
             <a:endParaRPr lang="en-PH"/>
           </a:p>
@@ -11085,7 +11085,7 @@
           <a:p>
             <a:fld id="{EB7773F0-1164-4DC7-AD33-7BA84420B4EA}" type="datetime1">
               <a:rPr lang="en-PH" smtClean="0"/>
-              <a:t>11/10/2025</a:t>
+              <a:t>10/25/2025</a:t>
             </a:fld>
             <a:endParaRPr lang="en-PH"/>
           </a:p>
@@ -11642,7 +11642,7 @@
           <a:p>
             <a:fld id="{EB7773F0-1164-4DC7-AD33-7BA84420B4EA}" type="datetime1">
               <a:rPr lang="en-PH" smtClean="0"/>
-              <a:t>11/10/2025</a:t>
+              <a:t>10/25/2025</a:t>
             </a:fld>
             <a:endParaRPr lang="en-PH"/>
           </a:p>
@@ -12108,7 +12108,7 @@
           <a:p>
             <a:fld id="{EB7773F0-1164-4DC7-AD33-7BA84420B4EA}" type="datetime1">
               <a:rPr lang="en-PH" smtClean="0"/>
-              <a:t>11/10/2025</a:t>
+              <a:t>10/25/2025</a:t>
             </a:fld>
             <a:endParaRPr lang="en-PH"/>
           </a:p>
@@ -12520,7 +12520,7 @@
           <a:p>
             <a:fld id="{EB7773F0-1164-4DC7-AD33-7BA84420B4EA}" type="datetime1">
               <a:rPr lang="en-PH" smtClean="0"/>
-              <a:t>11/10/2025</a:t>
+              <a:t>10/25/2025</a:t>
             </a:fld>
             <a:endParaRPr lang="en-PH"/>
           </a:p>
@@ -12990,7 +12990,7 @@
           <a:p>
             <a:fld id="{EB7773F0-1164-4DC7-AD33-7BA84420B4EA}" type="datetime1">
               <a:rPr lang="en-PH" smtClean="0"/>
-              <a:t>11/10/2025</a:t>
+              <a:t>10/25/2025</a:t>
             </a:fld>
             <a:endParaRPr lang="en-PH"/>
           </a:p>
@@ -13455,7 +13455,7 @@
           <a:p>
             <a:fld id="{EB7773F0-1164-4DC7-AD33-7BA84420B4EA}" type="datetime1">
               <a:rPr lang="en-PH" smtClean="0"/>
-              <a:t>11/10/2025</a:t>
+              <a:t>10/25/2025</a:t>
             </a:fld>
             <a:endParaRPr lang="en-PH"/>
           </a:p>
@@ -13895,7 +13895,7 @@
           <a:p>
             <a:fld id="{EB7773F0-1164-4DC7-AD33-7BA84420B4EA}" type="datetime1">
               <a:rPr lang="en-PH" smtClean="0"/>
-              <a:t>11/10/2025</a:t>
+              <a:t>10/25/2025</a:t>
             </a:fld>
             <a:endParaRPr lang="en-PH"/>
           </a:p>
@@ -14353,7 +14353,7 @@
           <a:p>
             <a:fld id="{EB7773F0-1164-4DC7-AD33-7BA84420B4EA}" type="datetime1">
               <a:rPr lang="en-PH" smtClean="0"/>
-              <a:t>11/10/2025</a:t>
+              <a:t>10/25/2025</a:t>
             </a:fld>
             <a:endParaRPr lang="en-PH"/>
           </a:p>

</xml_diff>